<commit_message>
Added an additional slide to the presentation detailing the technologise that the project will use.
</commit_message>
<xml_diff>
--- a/Real Estate Price Estimator - Presentation 1.pptx
+++ b/Real Estate Price Estimator - Presentation 1.pptx
@@ -7,12 +7,13 @@
   <p:sldIdLst>
     <p:sldId id="256" r:id="rId2"/>
     <p:sldId id="257" r:id="rId3"/>
-    <p:sldId id="258" r:id="rId4"/>
-    <p:sldId id="259" r:id="rId5"/>
-    <p:sldId id="260" r:id="rId6"/>
-    <p:sldId id="261" r:id="rId7"/>
-    <p:sldId id="262" r:id="rId8"/>
-    <p:sldId id="263" r:id="rId9"/>
+    <p:sldId id="264" r:id="rId4"/>
+    <p:sldId id="258" r:id="rId5"/>
+    <p:sldId id="259" r:id="rId6"/>
+    <p:sldId id="260" r:id="rId7"/>
+    <p:sldId id="261" r:id="rId8"/>
+    <p:sldId id="262" r:id="rId9"/>
+    <p:sldId id="263" r:id="rId10"/>
   </p:sldIdLst>
   <p:sldSz cx="12192000" cy="6858000"/>
   <p:notesSz cx="6858000" cy="9144000"/>
@@ -111,6 +112,11 @@
       </a:defRPr>
     </a:lvl9pPr>
   </p:defaultTextStyle>
+  <p:extLst>
+    <p:ext uri="{EFAFB233-063F-42B5-8137-9DF3F51BA10A}">
+      <p15:sldGuideLst xmlns:p15="http://schemas.microsoft.com/office/powerpoint/2012/main"/>
+    </p:ext>
+  </p:extLst>
 </p:presentation>
 </file>
 
@@ -14416,7 +14422,7 @@
           <a:p>
             <a:fld id="{88D38747-4367-4BD2-8D51-C97E202738E2}" type="datetime1">
               <a:rPr lang="en-US" smtClean="0"/>
-              <a:t>2/10/20</a:t>
+              <a:t>2/11/20</a:t>
             </a:fld>
             <a:endParaRPr lang="en-US" dirty="0"/>
           </a:p>
@@ -14721,7 +14727,7 @@
           <a:p>
             <a:fld id="{11F1B079-7EF0-44EE-B798-BCC497C9F3B2}" type="datetime1">
               <a:rPr lang="en-US" smtClean="0"/>
-              <a:t>2/10/20</a:t>
+              <a:t>2/11/20</a:t>
             </a:fld>
             <a:endParaRPr lang="en-US" dirty="0"/>
           </a:p>
@@ -14915,7 +14921,7 @@
           <a:p>
             <a:fld id="{28FF70A8-1D13-4657-95F0-A9EA54967B8D}" type="datetime1">
               <a:rPr lang="en-US" smtClean="0"/>
-              <a:t>2/10/20</a:t>
+              <a:t>2/11/20</a:t>
             </a:fld>
             <a:endParaRPr lang="en-US" dirty="0"/>
           </a:p>
@@ -15178,7 +15184,7 @@
           <a:p>
             <a:fld id="{21EB90AC-71BD-4C7F-8ACA-7B3F18292E63}" type="datetime1">
               <a:rPr lang="en-US" smtClean="0"/>
-              <a:t>2/10/20</a:t>
+              <a:t>2/11/20</a:t>
             </a:fld>
             <a:endParaRPr lang="en-US" dirty="0"/>
           </a:p>
@@ -15614,7 +15620,7 @@
           <a:p>
             <a:fld id="{4E6EFC2C-8905-46F0-B443-CE905B76BA01}" type="datetime1">
               <a:rPr lang="en-US" smtClean="0"/>
-              <a:t>2/10/20</a:t>
+              <a:t>2/11/20</a:t>
             </a:fld>
             <a:endParaRPr lang="en-US" dirty="0"/>
           </a:p>
@@ -16151,7 +16157,7 @@
           <a:p>
             <a:fld id="{D9079DC3-C9B5-499E-9140-0DC28B7074E2}" type="datetime1">
               <a:rPr lang="en-US" smtClean="0"/>
-              <a:t>2/10/20</a:t>
+              <a:t>2/11/20</a:t>
             </a:fld>
             <a:endParaRPr lang="en-US" dirty="0"/>
           </a:p>
@@ -17033,7 +17039,7 @@
           <a:p>
             <a:fld id="{30BB33EA-E472-4D22-9C03-A9C14AA21CED}" type="datetime1">
               <a:rPr lang="en-US" smtClean="0"/>
-              <a:t>2/10/20</a:t>
+              <a:t>2/11/20</a:t>
             </a:fld>
             <a:endParaRPr lang="en-US" dirty="0"/>
           </a:p>
@@ -17203,7 +17209,7 @@
           <a:p>
             <a:fld id="{217E833E-1B6D-415F-AD29-75AE8C43BD0D}" type="datetime1">
               <a:rPr lang="en-US" smtClean="0"/>
-              <a:t>2/10/20</a:t>
+              <a:t>2/11/20</a:t>
             </a:fld>
             <a:endParaRPr lang="en-US" dirty="0"/>
           </a:p>
@@ -17387,7 +17393,7 @@
           <a:p>
             <a:fld id="{8452596F-08A7-4B70-989A-F2B1CF31E66B}" type="datetime1">
               <a:rPr lang="en-US" smtClean="0"/>
-              <a:t>2/10/20</a:t>
+              <a:t>2/11/20</a:t>
             </a:fld>
             <a:endParaRPr lang="en-US" dirty="0"/>
           </a:p>
@@ -17557,7 +17563,7 @@
           <a:p>
             <a:fld id="{73C55A3C-5767-4844-A0A3-83778C2E5409}" type="datetime1">
               <a:rPr lang="en-US" smtClean="0"/>
-              <a:t>2/10/20</a:t>
+              <a:t>2/11/20</a:t>
             </a:fld>
             <a:endParaRPr lang="en-US" dirty="0"/>
           </a:p>
@@ -17801,7 +17807,7 @@
           <a:p>
             <a:fld id="{CAE507A8-A5CF-4D38-AB86-7EDDA87A85D4}" type="datetime1">
               <a:rPr lang="en-US" smtClean="0"/>
-              <a:t>2/10/20</a:t>
+              <a:t>2/11/20</a:t>
             </a:fld>
             <a:endParaRPr lang="en-US" dirty="0"/>
           </a:p>
@@ -18043,7 +18049,7 @@
           <a:p>
             <a:fld id="{BDFCD27C-8599-43EF-BA1D-14DDC1946E06}" type="datetime1">
               <a:rPr lang="en-US" smtClean="0"/>
-              <a:t>2/10/20</a:t>
+              <a:t>2/11/20</a:t>
             </a:fld>
             <a:endParaRPr lang="en-US" dirty="0"/>
           </a:p>
@@ -18524,7 +18530,7 @@
           <a:p>
             <a:fld id="{49343D99-809A-49C0-96E5-4250D0B498EE}" type="datetime1">
               <a:rPr lang="en-US" smtClean="0"/>
-              <a:t>2/10/20</a:t>
+              <a:t>2/11/20</a:t>
             </a:fld>
             <a:endParaRPr lang="en-US" dirty="0"/>
           </a:p>
@@ -18642,7 +18648,7 @@
           <a:p>
             <a:fld id="{A143DE9B-B678-4EFB-BB7D-A4370204A0B0}" type="datetime1">
               <a:rPr lang="en-US" smtClean="0"/>
-              <a:t>2/10/20</a:t>
+              <a:t>2/11/20</a:t>
             </a:fld>
             <a:endParaRPr lang="en-US" dirty="0"/>
           </a:p>
@@ -18737,7 +18743,7 @@
           <a:p>
             <a:fld id="{E68812DA-F765-4142-A6A3-A8ED7235E082}" type="datetime1">
               <a:rPr lang="en-US" smtClean="0"/>
-              <a:t>2/10/20</a:t>
+              <a:t>2/11/20</a:t>
             </a:fld>
             <a:endParaRPr lang="en-US" dirty="0"/>
           </a:p>
@@ -18992,7 +18998,7 @@
           <a:p>
             <a:fld id="{3E0277FD-7DE6-41D4-930D-AC99F5AFE54E}" type="datetime1">
               <a:rPr lang="en-US" smtClean="0"/>
-              <a:t>2/10/20</a:t>
+              <a:t>2/11/20</a:t>
             </a:fld>
             <a:endParaRPr lang="en-US" dirty="0"/>
           </a:p>
@@ -19299,7 +19305,7 @@
           <a:p>
             <a:fld id="{9EA15526-7079-4B7B-987C-1B5FAE11A0FF}" type="datetime1">
               <a:rPr lang="en-US" smtClean="0"/>
-              <a:t>2/10/20</a:t>
+              <a:t>2/11/20</a:t>
             </a:fld>
             <a:endParaRPr lang="en-US" dirty="0"/>
           </a:p>
@@ -19534,7 +19540,7 @@
           <a:p>
             <a:fld id="{073ED0CC-082F-4160-86E5-0D6041F12778}" type="datetime1">
               <a:rPr lang="en-US" smtClean="0"/>
-              <a:t>2/10/20</a:t>
+              <a:t>2/11/20</a:t>
             </a:fld>
             <a:endParaRPr lang="en-US" dirty="0"/>
           </a:p>
@@ -20445,7 +20451,7 @@
           </a:effectLst>
           <a:extLst>
             <a:ext uri="{91240B29-F687-4f45-9708-019B960494DF}">
-              <a14:hiddenLine xmlns="" xmlns:a16="http://schemas.microsoft.com/office/drawing/2014/main" xmlns:p14="http://schemas.microsoft.com/office/powerpoint/2010/main" xmlns:a14="http://schemas.microsoft.com/office/drawing/2010/main" w="9525">
+              <a14:hiddenLine xmlns:a14="http://schemas.microsoft.com/office/drawing/2010/main" xmlns:p14="http://schemas.microsoft.com/office/powerpoint/2010/main" xmlns:a16="http://schemas.microsoft.com/office/drawing/2014/main" xmlns="" w="9525">
                 <a:solidFill>
                   <a:srgbClr val="000000"/>
                 </a:solidFill>
@@ -20673,6 +20679,119 @@
 </file>
 
 <file path=ppt/slides/slide3.xml><?xml version="1.0" encoding="utf-8"?>
+<p:sld xmlns:a="http://schemas.openxmlformats.org/drawingml/2006/main" xmlns:r="http://schemas.openxmlformats.org/officeDocument/2006/relationships" xmlns:p="http://schemas.openxmlformats.org/presentationml/2006/main">
+  <p:cSld>
+    <p:spTree>
+      <p:nvGrpSpPr>
+        <p:cNvPr id="1" name=""/>
+        <p:cNvGrpSpPr/>
+        <p:nvPr/>
+      </p:nvGrpSpPr>
+      <p:grpSpPr>
+        <a:xfrm>
+          <a:off x="0" y="0"/>
+          <a:ext cx="0" cy="0"/>
+          <a:chOff x="0" y="0"/>
+          <a:chExt cx="0" cy="0"/>
+        </a:xfrm>
+      </p:grpSpPr>
+      <p:sp>
+        <p:nvSpPr>
+          <p:cNvPr id="2" name="Title 1">
+            <a:extLst>
+              <a:ext uri="{FF2B5EF4-FFF2-40B4-BE49-F238E27FC236}">
+                <a16:creationId xmlns:a16="http://schemas.microsoft.com/office/drawing/2014/main" id="{02A13DC0-92C3-DD49-BBDB-C16E130C82AD}"/>
+              </a:ext>
+            </a:extLst>
+          </p:cNvPr>
+          <p:cNvSpPr>
+            <a:spLocks noGrp="1"/>
+          </p:cNvSpPr>
+          <p:nvPr>
+            <p:ph type="title"/>
+          </p:nvPr>
+        </p:nvSpPr>
+        <p:spPr/>
+        <p:txBody>
+          <a:bodyPr/>
+          <a:lstStyle/>
+          <a:p>
+            <a:r>
+              <a:rPr lang="en-US" dirty="0"/>
+              <a:t>Development Tools</a:t>
+            </a:r>
+          </a:p>
+        </p:txBody>
+      </p:sp>
+      <p:sp>
+        <p:nvSpPr>
+          <p:cNvPr id="3" name="Content Placeholder 2">
+            <a:extLst>
+              <a:ext uri="{FF2B5EF4-FFF2-40B4-BE49-F238E27FC236}">
+                <a16:creationId xmlns:a16="http://schemas.microsoft.com/office/drawing/2014/main" id="{073081ED-96A6-A546-9EDB-B3156AF2400A}"/>
+              </a:ext>
+            </a:extLst>
+          </p:cNvPr>
+          <p:cNvSpPr>
+            <a:spLocks noGrp="1"/>
+          </p:cNvSpPr>
+          <p:nvPr>
+            <p:ph idx="1"/>
+          </p:nvPr>
+        </p:nvSpPr>
+        <p:spPr/>
+        <p:txBody>
+          <a:bodyPr/>
+          <a:lstStyle/>
+          <a:p>
+            <a:r>
+              <a:rPr lang="en-US" dirty="0"/>
+              <a:t>Front end: HTML, CSS, </a:t>
+            </a:r>
+            <a:r>
+              <a:rPr lang="en-US" dirty="0" err="1"/>
+              <a:t>Javascript</a:t>
+            </a:r>
+            <a:r>
+              <a:rPr lang="en-US" dirty="0"/>
+              <a:t> (Node)</a:t>
+            </a:r>
+          </a:p>
+          <a:p>
+            <a:r>
+              <a:rPr lang="en-US" dirty="0"/>
+              <a:t>Backend: Python, flask, </a:t>
+            </a:r>
+            <a:r>
+              <a:rPr lang="en-US" dirty="0" err="1"/>
+              <a:t>sklearn</a:t>
+            </a:r>
+            <a:r>
+              <a:rPr lang="en-US" dirty="0"/>
+              <a:t>, </a:t>
+            </a:r>
+            <a:r>
+              <a:rPr lang="en-US" dirty="0" err="1"/>
+              <a:t>numpy</a:t>
+            </a:r>
+            <a:endParaRPr lang="en-US" dirty="0"/>
+          </a:p>
+        </p:txBody>
+      </p:sp>
+    </p:spTree>
+    <p:extLst>
+      <p:ext uri="{BB962C8B-B14F-4D97-AF65-F5344CB8AC3E}">
+        <p14:creationId xmlns:p14="http://schemas.microsoft.com/office/powerpoint/2010/main" val="4019730951"/>
+      </p:ext>
+    </p:extLst>
+  </p:cSld>
+  <p:clrMapOvr>
+    <a:masterClrMapping/>
+  </p:clrMapOvr>
+</p:sld>
+</file>
+
+<file path=ppt/slides/slide4.xml><?xml version="1.0" encoding="utf-8"?>
 <p:sld xmlns:a="http://schemas.openxmlformats.org/drawingml/2006/main" xmlns:r="http://schemas.openxmlformats.org/officeDocument/2006/relationships" xmlns:p="http://schemas.openxmlformats.org/presentationml/2006/main">
   <p:cSld>
     <p:bg>
@@ -21024,7 +21143,7 @@
 </p:sld>
 </file>
 
-<file path=ppt/slides/slide4.xml><?xml version="1.0" encoding="utf-8"?>
+<file path=ppt/slides/slide5.xml><?xml version="1.0" encoding="utf-8"?>
 <p:sld xmlns:a="http://schemas.openxmlformats.org/drawingml/2006/main" xmlns:r="http://schemas.openxmlformats.org/officeDocument/2006/relationships" xmlns:p="http://schemas.openxmlformats.org/presentationml/2006/main">
   <p:cSld>
     <p:bg>
@@ -21139,7 +21258,7 @@
 </p:sld>
 </file>
 
-<file path=ppt/slides/slide5.xml><?xml version="1.0" encoding="utf-8"?>
+<file path=ppt/slides/slide6.xml><?xml version="1.0" encoding="utf-8"?>
 <p:sld xmlns:a="http://schemas.openxmlformats.org/drawingml/2006/main" xmlns:r="http://schemas.openxmlformats.org/officeDocument/2006/relationships" xmlns:p="http://schemas.openxmlformats.org/presentationml/2006/main">
   <p:cSld>
     <p:bg>
@@ -21254,7 +21373,7 @@
 </p:sld>
 </file>
 
-<file path=ppt/slides/slide6.xml><?xml version="1.0" encoding="utf-8"?>
+<file path=ppt/slides/slide7.xml><?xml version="1.0" encoding="utf-8"?>
 <p:sld xmlns:a="http://schemas.openxmlformats.org/drawingml/2006/main" xmlns:r="http://schemas.openxmlformats.org/officeDocument/2006/relationships" xmlns:p="http://schemas.openxmlformats.org/presentationml/2006/main">
   <p:cSld>
     <p:bg>
@@ -21370,7 +21489,7 @@
 </p:sld>
 </file>
 
-<file path=ppt/slides/slide7.xml><?xml version="1.0" encoding="utf-8"?>
+<file path=ppt/slides/slide8.xml><?xml version="1.0" encoding="utf-8"?>
 <p:sld xmlns:a="http://schemas.openxmlformats.org/drawingml/2006/main" xmlns:r="http://schemas.openxmlformats.org/officeDocument/2006/relationships" xmlns:p="http://schemas.openxmlformats.org/presentationml/2006/main">
   <p:cSld>
     <p:bg>
@@ -21529,7 +21648,7 @@
 </p:sld>
 </file>
 
-<file path=ppt/slides/slide8.xml><?xml version="1.0" encoding="utf-8"?>
+<file path=ppt/slides/slide9.xml><?xml version="1.0" encoding="utf-8"?>
 <p:sld xmlns:a="http://schemas.openxmlformats.org/drawingml/2006/main" xmlns:r="http://schemas.openxmlformats.org/officeDocument/2006/relationships" xmlns:p="http://schemas.openxmlformats.org/presentationml/2006/main">
   <p:cSld>
     <p:bg>

</xml_diff>